<commit_message>
update TLS + Java Streams + Nginx
</commit_message>
<xml_diff>
--- a/Presentations/TLS 1.3/TLS 1.3.pptx
+++ b/Presentations/TLS 1.3/TLS 1.3.pptx
@@ -28,10 +28,13 @@
     <p:sldId id="406" r:id="rId22"/>
     <p:sldId id="408" r:id="rId23"/>
     <p:sldId id="405" r:id="rId24"/>
-    <p:sldId id="402" r:id="rId25"/>
-    <p:sldId id="407" r:id="rId26"/>
-    <p:sldId id="404" r:id="rId27"/>
-    <p:sldId id="259" r:id="rId28"/>
+    <p:sldId id="419" r:id="rId25"/>
+    <p:sldId id="402" r:id="rId26"/>
+    <p:sldId id="421" r:id="rId27"/>
+    <p:sldId id="420" r:id="rId28"/>
+    <p:sldId id="407" r:id="rId29"/>
+    <p:sldId id="404" r:id="rId30"/>
+    <p:sldId id="259" r:id="rId31"/>
   </p:sldIdLst>
   <p:sldSz cx="9144000" cy="6858000" type="screen4x3"/>
   <p:notesSz cx="6858000" cy="9144000"/>
@@ -370,7 +373,7 @@
               <a:pPr>
                 <a:defRPr/>
               </a:pPr>
-              <a:t>01/04/2021</a:t>
+              <a:t>09/04/2022</a:t>
             </a:fld>
             <a:endParaRPr lang="fr-CA"/>
           </a:p>
@@ -562,7 +565,7 @@
               <a:pPr>
                 <a:defRPr/>
               </a:pPr>
-              <a:t>01/04/2021</a:t>
+              <a:t>09/04/2022</a:t>
             </a:fld>
             <a:endParaRPr lang="fr-CA"/>
           </a:p>
@@ -764,7 +767,7 @@
               <a:pPr>
                 <a:defRPr/>
               </a:pPr>
-              <a:t>01/04/2021</a:t>
+              <a:t>09/04/2022</a:t>
             </a:fld>
             <a:endParaRPr lang="fr-CA"/>
           </a:p>
@@ -956,7 +959,7 @@
               <a:pPr>
                 <a:defRPr/>
               </a:pPr>
-              <a:t>01/04/2021</a:t>
+              <a:t>09/04/2022</a:t>
             </a:fld>
             <a:endParaRPr lang="fr-CA"/>
           </a:p>
@@ -1224,7 +1227,7 @@
               <a:pPr>
                 <a:defRPr/>
               </a:pPr>
-              <a:t>01/04/2021</a:t>
+              <a:t>09/04/2022</a:t>
             </a:fld>
             <a:endParaRPr lang="fr-CA"/>
           </a:p>
@@ -1534,7 +1537,7 @@
               <a:pPr>
                 <a:defRPr/>
               </a:pPr>
-              <a:t>01/04/2021</a:t>
+              <a:t>09/04/2022</a:t>
             </a:fld>
             <a:endParaRPr lang="fr-CA"/>
           </a:p>
@@ -1978,7 +1981,7 @@
               <a:pPr>
                 <a:defRPr/>
               </a:pPr>
-              <a:t>01/04/2021</a:t>
+              <a:t>09/04/2022</a:t>
             </a:fld>
             <a:endParaRPr lang="fr-CA"/>
           </a:p>
@@ -2118,7 +2121,7 @@
               <a:pPr>
                 <a:defRPr/>
               </a:pPr>
-              <a:t>01/04/2021</a:t>
+              <a:t>09/04/2022</a:t>
             </a:fld>
             <a:endParaRPr lang="fr-CA"/>
           </a:p>
@@ -2235,7 +2238,7 @@
               <a:pPr>
                 <a:defRPr/>
               </a:pPr>
-              <a:t>01/04/2021</a:t>
+              <a:t>09/04/2022</a:t>
             </a:fld>
             <a:endParaRPr lang="fr-CA"/>
           </a:p>
@@ -2534,7 +2537,7 @@
               <a:pPr>
                 <a:defRPr/>
               </a:pPr>
-              <a:t>01/04/2021</a:t>
+              <a:t>09/04/2022</a:t>
             </a:fld>
             <a:endParaRPr lang="fr-CA"/>
           </a:p>
@@ -2816,7 +2819,7 @@
               <a:pPr>
                 <a:defRPr/>
               </a:pPr>
-              <a:t>01/04/2021</a:t>
+              <a:t>09/04/2022</a:t>
             </a:fld>
             <a:endParaRPr lang="fr-CA"/>
           </a:p>
@@ -3080,7 +3083,7 @@
               <a:pPr>
                 <a:defRPr/>
               </a:pPr>
-              <a:t>01/04/2021</a:t>
+              <a:t>09/04/2022</a:t>
             </a:fld>
             <a:endParaRPr lang="fr-CA"/>
           </a:p>
@@ -4726,7 +4729,7 @@
                   <a:srgbClr val="3C5790"/>
                 </a:solidFill>
               </a:rPr>
-              <a:t> ensure and correct data transmission has to verify the identity of the user who will have access to the data.</a:t>
+              <a:t> ensure and correct data transmission must verify the identity of the user who will have access to the data.</a:t>
             </a:r>
           </a:p>
           <a:p>
@@ -5615,7 +5618,7 @@
                   <a:srgbClr val="3C5790"/>
                 </a:solidFill>
               </a:rPr>
-              <a:t> are mainly used for Java web applications and they are in binary form with an extension of .der or .</a:t>
+              <a:t> are mainly used for Java web applications, and they are in binary form with an extension of .der or .</a:t>
             </a:r>
             <a:r>
               <a:rPr lang="en-US" sz="1400" dirty="0" err="1">
@@ -6556,130 +6559,45 @@
                   <a:schemeClr val="bg1"/>
                 </a:solidFill>
               </a:rPr>
-              <a:t> (</a:t>
-            </a:r>
-            <a:r>
-              <a:rPr lang="fr-CA" dirty="0" err="1">
-                <a:solidFill>
-                  <a:schemeClr val="bg1"/>
-                </a:solidFill>
-              </a:rPr>
-              <a:t>cont</a:t>
-            </a:r>
-            <a:r>
-              <a:rPr lang="fr-CA" dirty="0">
-                <a:solidFill>
-                  <a:schemeClr val="bg1"/>
-                </a:solidFill>
-              </a:rPr>
-              <a:t>.)</a:t>
-            </a:r>
-          </a:p>
-        </p:txBody>
-      </p:sp>
-      <p:sp>
-        <p:nvSpPr>
-          <p:cNvPr id="4099" name="Espace réservé du contenu 4"/>
-          <p:cNvSpPr>
-            <a:spLocks noGrp="1"/>
-          </p:cNvSpPr>
-          <p:nvPr>
-            <p:ph idx="1"/>
-          </p:nvPr>
-        </p:nvSpPr>
+              <a:t> </a:t>
+            </a:r>
+          </a:p>
+        </p:txBody>
+      </p:sp>
+      <p:pic>
+        <p:nvPicPr>
+          <p:cNvPr id="5" name="Picture 4">
+            <a:extLst>
+              <a:ext uri="{FF2B5EF4-FFF2-40B4-BE49-F238E27FC236}">
+                <a16:creationId xmlns:a16="http://schemas.microsoft.com/office/drawing/2014/main" id="{3BCCD44C-2C51-4D60-8557-95B4F3361EA0}"/>
+              </a:ext>
+            </a:extLst>
+          </p:cNvPr>
+          <p:cNvPicPr>
+            <a:picLocks noChangeAspect="1"/>
+          </p:cNvPicPr>
+          <p:nvPr/>
+        </p:nvPicPr>
+        <p:blipFill>
+          <a:blip r:embed="rId3"/>
+          <a:stretch>
+            <a:fillRect/>
+          </a:stretch>
+        </p:blipFill>
         <p:spPr>
           <a:xfrm>
-            <a:off x="304800" y="1905000"/>
-            <a:ext cx="8839200" cy="1600200"/>
+            <a:off x="424285" y="2251112"/>
+            <a:ext cx="8255427" cy="4302124"/>
           </a:xfrm>
+          <a:prstGeom prst="rect">
+            <a:avLst/>
+          </a:prstGeom>
         </p:spPr>
-        <p:txBody>
-          <a:bodyPr/>
-          <a:lstStyle/>
-          <a:p>
-            <a:r>
-              <a:rPr lang="en-US" sz="1400" dirty="0">
-                <a:solidFill>
-                  <a:srgbClr val="3C5790"/>
-                </a:solidFill>
-              </a:rPr>
-              <a:t>TLS 1.3 shrinks the size of the cipher suites used for encryption.</a:t>
-            </a:r>
-          </a:p>
-          <a:p>
-            <a:r>
-              <a:rPr lang="en-US" sz="1400" dirty="0">
-                <a:solidFill>
-                  <a:srgbClr val="3C5790"/>
-                </a:solidFill>
-              </a:rPr>
-              <a:t>TLS relies on key exchanges to establish a secure connection. In earlier versions, keys could be exchanged during the handshake using one of the 2 mechanism: a </a:t>
-            </a:r>
-            <a:r>
-              <a:rPr lang="en-US" sz="1400" b="1" dirty="0">
-                <a:solidFill>
-                  <a:srgbClr val="3C5790"/>
-                </a:solidFill>
-              </a:rPr>
-              <a:t>static RSA key</a:t>
-            </a:r>
-            <a:r>
-              <a:rPr lang="en-US" sz="1400" dirty="0">
-                <a:solidFill>
-                  <a:srgbClr val="3C5790"/>
-                </a:solidFill>
-              </a:rPr>
-              <a:t> or a </a:t>
-            </a:r>
-            <a:r>
-              <a:rPr lang="en-US" sz="1400" b="1" dirty="0">
-                <a:solidFill>
-                  <a:srgbClr val="3C5790"/>
-                </a:solidFill>
-              </a:rPr>
-              <a:t>Diffie-Hellman key</a:t>
-            </a:r>
-            <a:r>
-              <a:rPr lang="en-US" sz="1400" dirty="0">
-                <a:solidFill>
-                  <a:srgbClr val="3C5790"/>
-                </a:solidFill>
-              </a:rPr>
-              <a:t>.</a:t>
-            </a:r>
-          </a:p>
-          <a:p>
-            <a:r>
-              <a:rPr lang="en-US" sz="1400" dirty="0">
-                <a:solidFill>
-                  <a:srgbClr val="3C5790"/>
-                </a:solidFill>
-              </a:rPr>
-              <a:t>The </a:t>
-            </a:r>
-            <a:r>
-              <a:rPr lang="en-US" sz="1400" u="sng" dirty="0">
-                <a:solidFill>
-                  <a:srgbClr val="3C5790"/>
-                </a:solidFill>
-              </a:rPr>
-              <a:t>RSA has been removed</a:t>
-            </a:r>
-            <a:r>
-              <a:rPr lang="en-US" sz="1400" dirty="0">
-                <a:solidFill>
-                  <a:srgbClr val="3C5790"/>
-                </a:solidFill>
-              </a:rPr>
-              <a:t>, along with all static (non-PFS) key exchanges, while retaining ephemeral Diffie-Hellman keys. </a:t>
-            </a:r>
-          </a:p>
-        </p:txBody>
-      </p:sp>
+      </p:pic>
     </p:spTree>
     <p:extLst>
       <p:ext uri="{BB962C8B-B14F-4D97-AF65-F5344CB8AC3E}">
-        <p14:creationId xmlns:p14="http://schemas.microsoft.com/office/powerpoint/2010/main" val="1095256783"/>
+        <p14:creationId xmlns:p14="http://schemas.microsoft.com/office/powerpoint/2010/main" val="2244317719"/>
       </p:ext>
     </p:extLst>
   </p:cSld>
@@ -6734,6 +6652,569 @@
           <a:lstStyle/>
           <a:p>
             <a:r>
+              <a:rPr lang="fr-CA" dirty="0" err="1">
+                <a:solidFill>
+                  <a:schemeClr val="bg1"/>
+                </a:solidFill>
+              </a:rPr>
+              <a:t>Core</a:t>
+            </a:r>
+            <a:r>
+              <a:rPr lang="fr-CA" dirty="0">
+                <a:solidFill>
+                  <a:schemeClr val="bg1"/>
+                </a:solidFill>
+              </a:rPr>
+              <a:t> (</a:t>
+            </a:r>
+            <a:r>
+              <a:rPr lang="fr-CA" dirty="0" err="1">
+                <a:solidFill>
+                  <a:schemeClr val="bg1"/>
+                </a:solidFill>
+              </a:rPr>
+              <a:t>cont</a:t>
+            </a:r>
+            <a:r>
+              <a:rPr lang="fr-CA" dirty="0">
+                <a:solidFill>
+                  <a:schemeClr val="bg1"/>
+                </a:solidFill>
+              </a:rPr>
+              <a:t>.)</a:t>
+            </a:r>
+          </a:p>
+        </p:txBody>
+      </p:sp>
+      <p:sp>
+        <p:nvSpPr>
+          <p:cNvPr id="4099" name="Espace réservé du contenu 4"/>
+          <p:cNvSpPr>
+            <a:spLocks noGrp="1"/>
+          </p:cNvSpPr>
+          <p:nvPr>
+            <p:ph idx="1"/>
+          </p:nvPr>
+        </p:nvSpPr>
+        <p:spPr>
+          <a:xfrm>
+            <a:off x="304800" y="1905000"/>
+            <a:ext cx="8839200" cy="1981200"/>
+          </a:xfrm>
+        </p:spPr>
+        <p:txBody>
+          <a:bodyPr/>
+          <a:lstStyle/>
+          <a:p>
+            <a:r>
+              <a:rPr lang="en-US" sz="1400" dirty="0">
+                <a:solidFill>
+                  <a:srgbClr val="3C5790"/>
+                </a:solidFill>
+              </a:rPr>
+              <a:t>The TLS 1.3 full handshake starts with a hello message that the client sends to the server:</a:t>
+            </a:r>
+          </a:p>
+          <a:p>
+            <a:pPr lvl="1">
+              <a:buFont typeface="Wingdings" panose="05000000000000000000" pitchFamily="2" charset="2"/>
+              <a:buChar char="Ø"/>
+            </a:pPr>
+            <a:r>
+              <a:rPr lang="en-US" sz="1400" dirty="0">
+                <a:solidFill>
+                  <a:srgbClr val="3C5790"/>
+                </a:solidFill>
+              </a:rPr>
+              <a:t>a list of protocol version that client supports.</a:t>
+            </a:r>
+          </a:p>
+          <a:p>
+            <a:pPr lvl="1">
+              <a:buFont typeface="Wingdings" panose="05000000000000000000" pitchFamily="2" charset="2"/>
+              <a:buChar char="Ø"/>
+            </a:pPr>
+            <a:r>
+              <a:rPr lang="en-US" sz="1400" dirty="0">
+                <a:solidFill>
+                  <a:srgbClr val="3C5790"/>
+                </a:solidFill>
+              </a:rPr>
+              <a:t>list of supported AEAD symmetric cipher suites. In this case, there are 2 options: AES-256-GCM or CHACHA20-POLY1305</a:t>
+            </a:r>
+          </a:p>
+          <a:p>
+            <a:pPr lvl="1">
+              <a:buFont typeface="Wingdings" panose="05000000000000000000" pitchFamily="2" charset="2"/>
+              <a:buChar char="Ø"/>
+            </a:pPr>
+            <a:r>
+              <a:rPr lang="en-US" sz="1400" dirty="0">
+                <a:solidFill>
+                  <a:srgbClr val="3C5790"/>
+                </a:solidFill>
+              </a:rPr>
+              <a:t>a list of supported key exchange groups: Finite field Diffie-Hellman Ephemeral and Elliptic-Curve Diffie-Hellman Ephemeral</a:t>
+            </a:r>
+          </a:p>
+          <a:p>
+            <a:pPr lvl="1">
+              <a:buFont typeface="Wingdings" panose="05000000000000000000" pitchFamily="2" charset="2"/>
+              <a:buChar char="Ø"/>
+            </a:pPr>
+            <a:r>
+              <a:rPr lang="en-US" sz="1400" dirty="0">
+                <a:solidFill>
+                  <a:srgbClr val="3C5790"/>
+                </a:solidFill>
+              </a:rPr>
+              <a:t>a list of signature algorithms it supports.</a:t>
+            </a:r>
+          </a:p>
+        </p:txBody>
+      </p:sp>
+    </p:spTree>
+    <p:extLst>
+      <p:ext uri="{BB962C8B-B14F-4D97-AF65-F5344CB8AC3E}">
+        <p14:creationId xmlns:p14="http://schemas.microsoft.com/office/powerpoint/2010/main" val="1095256783"/>
+      </p:ext>
+    </p:extLst>
+  </p:cSld>
+  <p:clrMapOvr>
+    <a:masterClrMapping/>
+  </p:clrMapOvr>
+</p:sld>
+</file>
+
+<file path=ppt/slides/slide26.xml><?xml version="1.0" encoding="utf-8"?>
+<p:sld xmlns:a="http://schemas.openxmlformats.org/drawingml/2006/main" xmlns:r="http://schemas.openxmlformats.org/officeDocument/2006/relationships" xmlns:p="http://schemas.openxmlformats.org/presentationml/2006/main">
+  <p:cSld>
+    <p:bg>
+      <p:bgPr>
+        <a:blipFill dpi="0" rotWithShape="0">
+          <a:blip r:embed="rId2" cstate="print"/>
+          <a:srcRect/>
+          <a:stretch>
+            <a:fillRect/>
+          </a:stretch>
+        </a:blipFill>
+        <a:effectLst/>
+      </p:bgPr>
+    </p:bg>
+    <p:spTree>
+      <p:nvGrpSpPr>
+        <p:cNvPr id="1" name=""/>
+        <p:cNvGrpSpPr/>
+        <p:nvPr/>
+      </p:nvGrpSpPr>
+      <p:grpSpPr>
+        <a:xfrm>
+          <a:off x="0" y="0"/>
+          <a:ext cx="0" cy="0"/>
+          <a:chOff x="0" y="0"/>
+          <a:chExt cx="0" cy="0"/>
+        </a:xfrm>
+      </p:grpSpPr>
+      <p:sp>
+        <p:nvSpPr>
+          <p:cNvPr id="4098" name="Titre 3"/>
+          <p:cNvSpPr>
+            <a:spLocks noGrp="1"/>
+          </p:cNvSpPr>
+          <p:nvPr>
+            <p:ph type="title"/>
+          </p:nvPr>
+        </p:nvSpPr>
+        <p:spPr/>
+        <p:txBody>
+          <a:bodyPr/>
+          <a:lstStyle/>
+          <a:p>
+            <a:r>
+              <a:rPr lang="fr-CA" dirty="0" err="1">
+                <a:solidFill>
+                  <a:schemeClr val="bg1"/>
+                </a:solidFill>
+              </a:rPr>
+              <a:t>Core</a:t>
+            </a:r>
+            <a:r>
+              <a:rPr lang="fr-CA" dirty="0">
+                <a:solidFill>
+                  <a:schemeClr val="bg1"/>
+                </a:solidFill>
+              </a:rPr>
+              <a:t> (</a:t>
+            </a:r>
+            <a:r>
+              <a:rPr lang="fr-CA" dirty="0" err="1">
+                <a:solidFill>
+                  <a:schemeClr val="bg1"/>
+                </a:solidFill>
+              </a:rPr>
+              <a:t>cont</a:t>
+            </a:r>
+            <a:r>
+              <a:rPr lang="fr-CA" dirty="0">
+                <a:solidFill>
+                  <a:schemeClr val="bg1"/>
+                </a:solidFill>
+              </a:rPr>
+              <a:t>.)</a:t>
+            </a:r>
+          </a:p>
+        </p:txBody>
+      </p:sp>
+      <p:sp>
+        <p:nvSpPr>
+          <p:cNvPr id="4099" name="Espace réservé du contenu 4"/>
+          <p:cNvSpPr>
+            <a:spLocks noGrp="1"/>
+          </p:cNvSpPr>
+          <p:nvPr>
+            <p:ph idx="1"/>
+          </p:nvPr>
+        </p:nvSpPr>
+        <p:spPr>
+          <a:xfrm>
+            <a:off x="304800" y="1905000"/>
+            <a:ext cx="8839200" cy="2133600"/>
+          </a:xfrm>
+        </p:spPr>
+        <p:txBody>
+          <a:bodyPr/>
+          <a:lstStyle/>
+          <a:p>
+            <a:r>
+              <a:rPr lang="en-US" sz="1400" dirty="0">
+                <a:solidFill>
+                  <a:srgbClr val="3C5790"/>
+                </a:solidFill>
+              </a:rPr>
+              <a:t>After receiving the client hello message, the server also sends back its hello message, which contains:</a:t>
+            </a:r>
+          </a:p>
+          <a:p>
+            <a:pPr lvl="1">
+              <a:buFont typeface="Wingdings" panose="05000000000000000000" pitchFamily="2" charset="2"/>
+              <a:buChar char="Ø"/>
+            </a:pPr>
+            <a:r>
+              <a:rPr lang="en-US" sz="1400" dirty="0">
+                <a:solidFill>
+                  <a:srgbClr val="3C5790"/>
+                </a:solidFill>
+              </a:rPr>
+              <a:t>selected protocol version TLS 1.3</a:t>
+            </a:r>
+          </a:p>
+          <a:p>
+            <a:pPr lvl="1">
+              <a:buFont typeface="Wingdings" panose="05000000000000000000" pitchFamily="2" charset="2"/>
+              <a:buChar char="Ø"/>
+            </a:pPr>
+            <a:r>
+              <a:rPr lang="en-US" sz="1400" dirty="0">
+                <a:solidFill>
+                  <a:srgbClr val="3C5790"/>
+                </a:solidFill>
+              </a:rPr>
+              <a:t>selected cipher suites: AES-256-GCM</a:t>
+            </a:r>
+          </a:p>
+          <a:p>
+            <a:pPr lvl="1">
+              <a:buFont typeface="Wingdings" panose="05000000000000000000" pitchFamily="2" charset="2"/>
+              <a:buChar char="Ø"/>
+            </a:pPr>
+            <a:r>
+              <a:rPr lang="en-US" sz="1400" dirty="0">
+                <a:solidFill>
+                  <a:srgbClr val="3C5790"/>
+                </a:solidFill>
+              </a:rPr>
+              <a:t>selected key exchange method: Diffie-Hellman Ephemeral</a:t>
+            </a:r>
+          </a:p>
+          <a:p>
+            <a:pPr lvl="1">
+              <a:buFont typeface="Wingdings" panose="05000000000000000000" pitchFamily="2" charset="2"/>
+              <a:buChar char="Ø"/>
+            </a:pPr>
+            <a:r>
+              <a:rPr lang="en-US" sz="1400" dirty="0">
+                <a:solidFill>
+                  <a:srgbClr val="3C5790"/>
+                </a:solidFill>
+              </a:rPr>
+              <a:t>the server’s public key for that chosen method</a:t>
+            </a:r>
+          </a:p>
+          <a:p>
+            <a:pPr lvl="1">
+              <a:buFont typeface="Wingdings" panose="05000000000000000000" pitchFamily="2" charset="2"/>
+              <a:buChar char="Ø"/>
+            </a:pPr>
+            <a:r>
+              <a:rPr lang="en-US" sz="1400" dirty="0">
+                <a:solidFill>
+                  <a:srgbClr val="3C5790"/>
+                </a:solidFill>
+              </a:rPr>
+              <a:t>next field is a request for the client’s certificate, which is optional and will only be sent if the server wants to authenticate the client by its certificate</a:t>
+            </a:r>
+          </a:p>
+        </p:txBody>
+      </p:sp>
+    </p:spTree>
+    <p:extLst>
+      <p:ext uri="{BB962C8B-B14F-4D97-AF65-F5344CB8AC3E}">
+        <p14:creationId xmlns:p14="http://schemas.microsoft.com/office/powerpoint/2010/main" val="4267206697"/>
+      </p:ext>
+    </p:extLst>
+  </p:cSld>
+  <p:clrMapOvr>
+    <a:masterClrMapping/>
+  </p:clrMapOvr>
+</p:sld>
+</file>
+
+<file path=ppt/slides/slide27.xml><?xml version="1.0" encoding="utf-8"?>
+<p:sld xmlns:a="http://schemas.openxmlformats.org/drawingml/2006/main" xmlns:r="http://schemas.openxmlformats.org/officeDocument/2006/relationships" xmlns:p="http://schemas.openxmlformats.org/presentationml/2006/main">
+  <p:cSld>
+    <p:bg>
+      <p:bgPr>
+        <a:blipFill dpi="0" rotWithShape="0">
+          <a:blip r:embed="rId2" cstate="print"/>
+          <a:srcRect/>
+          <a:stretch>
+            <a:fillRect/>
+          </a:stretch>
+        </a:blipFill>
+        <a:effectLst/>
+      </p:bgPr>
+    </p:bg>
+    <p:spTree>
+      <p:nvGrpSpPr>
+        <p:cNvPr id="1" name=""/>
+        <p:cNvGrpSpPr/>
+        <p:nvPr/>
+      </p:nvGrpSpPr>
+      <p:grpSpPr>
+        <a:xfrm>
+          <a:off x="0" y="0"/>
+          <a:ext cx="0" cy="0"/>
+          <a:chOff x="0" y="0"/>
+          <a:chExt cx="0" cy="0"/>
+        </a:xfrm>
+      </p:grpSpPr>
+      <p:sp>
+        <p:nvSpPr>
+          <p:cNvPr id="4098" name="Titre 3"/>
+          <p:cNvSpPr>
+            <a:spLocks noGrp="1"/>
+          </p:cNvSpPr>
+          <p:nvPr>
+            <p:ph type="title"/>
+          </p:nvPr>
+        </p:nvSpPr>
+        <p:spPr/>
+        <p:txBody>
+          <a:bodyPr/>
+          <a:lstStyle/>
+          <a:p>
+            <a:r>
+              <a:rPr lang="fr-CA" dirty="0" err="1">
+                <a:solidFill>
+                  <a:schemeClr val="bg1"/>
+                </a:solidFill>
+              </a:rPr>
+              <a:t>Core</a:t>
+            </a:r>
+            <a:r>
+              <a:rPr lang="fr-CA" dirty="0">
+                <a:solidFill>
+                  <a:schemeClr val="bg1"/>
+                </a:solidFill>
+              </a:rPr>
+              <a:t> (</a:t>
+            </a:r>
+            <a:r>
+              <a:rPr lang="fr-CA" dirty="0" err="1">
+                <a:solidFill>
+                  <a:schemeClr val="bg1"/>
+                </a:solidFill>
+              </a:rPr>
+              <a:t>cont</a:t>
+            </a:r>
+            <a:r>
+              <a:rPr lang="fr-CA" dirty="0">
+                <a:solidFill>
+                  <a:schemeClr val="bg1"/>
+                </a:solidFill>
+              </a:rPr>
+              <a:t>.)</a:t>
+            </a:r>
+          </a:p>
+        </p:txBody>
+      </p:sp>
+      <p:sp>
+        <p:nvSpPr>
+          <p:cNvPr id="4099" name="Espace réservé du contenu 4"/>
+          <p:cNvSpPr>
+            <a:spLocks noGrp="1"/>
+          </p:cNvSpPr>
+          <p:nvPr>
+            <p:ph idx="1"/>
+          </p:nvPr>
+        </p:nvSpPr>
+        <p:spPr>
+          <a:xfrm>
+            <a:off x="304800" y="1905000"/>
+            <a:ext cx="8839200" cy="1600200"/>
+          </a:xfrm>
+        </p:spPr>
+        <p:txBody>
+          <a:bodyPr/>
+          <a:lstStyle/>
+          <a:p>
+            <a:r>
+              <a:rPr lang="en-US" sz="1400" dirty="0">
+                <a:solidFill>
+                  <a:srgbClr val="3C5790"/>
+                </a:solidFill>
+              </a:rPr>
+              <a:t>TLS 1.3 shrinks the size of the cipher suites used for encryption.</a:t>
+            </a:r>
+          </a:p>
+          <a:p>
+            <a:r>
+              <a:rPr lang="en-US" sz="1400" dirty="0">
+                <a:solidFill>
+                  <a:srgbClr val="3C5790"/>
+                </a:solidFill>
+              </a:rPr>
+              <a:t>TLS relies on key exchanges to establish a secure connection. In earlier versions, keys could be exchanged during the handshake using one of the 2 mechanism: a </a:t>
+            </a:r>
+            <a:r>
+              <a:rPr lang="en-US" sz="1400" b="1" dirty="0">
+                <a:solidFill>
+                  <a:srgbClr val="3C5790"/>
+                </a:solidFill>
+              </a:rPr>
+              <a:t>static RSA key</a:t>
+            </a:r>
+            <a:r>
+              <a:rPr lang="en-US" sz="1400" dirty="0">
+                <a:solidFill>
+                  <a:srgbClr val="3C5790"/>
+                </a:solidFill>
+              </a:rPr>
+              <a:t> or a </a:t>
+            </a:r>
+            <a:r>
+              <a:rPr lang="en-US" sz="1400" b="1" dirty="0">
+                <a:solidFill>
+                  <a:srgbClr val="3C5790"/>
+                </a:solidFill>
+              </a:rPr>
+              <a:t>Diffie-Hellman key</a:t>
+            </a:r>
+            <a:r>
+              <a:rPr lang="en-US" sz="1400" dirty="0">
+                <a:solidFill>
+                  <a:srgbClr val="3C5790"/>
+                </a:solidFill>
+              </a:rPr>
+              <a:t>.</a:t>
+            </a:r>
+          </a:p>
+          <a:p>
+            <a:r>
+              <a:rPr lang="en-US" sz="1400" dirty="0">
+                <a:solidFill>
+                  <a:srgbClr val="3C5790"/>
+                </a:solidFill>
+              </a:rPr>
+              <a:t>The </a:t>
+            </a:r>
+            <a:r>
+              <a:rPr lang="en-US" sz="1400" u="sng" dirty="0">
+                <a:solidFill>
+                  <a:srgbClr val="3C5790"/>
+                </a:solidFill>
+              </a:rPr>
+              <a:t>RSA has been removed</a:t>
+            </a:r>
+            <a:r>
+              <a:rPr lang="en-US" sz="1400" dirty="0">
+                <a:solidFill>
+                  <a:srgbClr val="3C5790"/>
+                </a:solidFill>
+              </a:rPr>
+              <a:t>, along with all static (non-PFS) key exchanges, while retaining ephemeral Diffie-Hellman keys. </a:t>
+            </a:r>
+          </a:p>
+        </p:txBody>
+      </p:sp>
+    </p:spTree>
+    <p:extLst>
+      <p:ext uri="{BB962C8B-B14F-4D97-AF65-F5344CB8AC3E}">
+        <p14:creationId xmlns:p14="http://schemas.microsoft.com/office/powerpoint/2010/main" val="4168266094"/>
+      </p:ext>
+    </p:extLst>
+  </p:cSld>
+  <p:clrMapOvr>
+    <a:masterClrMapping/>
+  </p:clrMapOvr>
+</p:sld>
+</file>
+
+<file path=ppt/slides/slide28.xml><?xml version="1.0" encoding="utf-8"?>
+<p:sld xmlns:a="http://schemas.openxmlformats.org/drawingml/2006/main" xmlns:r="http://schemas.openxmlformats.org/officeDocument/2006/relationships" xmlns:p="http://schemas.openxmlformats.org/presentationml/2006/main">
+  <p:cSld>
+    <p:bg>
+      <p:bgPr>
+        <a:blipFill dpi="0" rotWithShape="0">
+          <a:blip r:embed="rId2" cstate="print"/>
+          <a:srcRect/>
+          <a:stretch>
+            <a:fillRect/>
+          </a:stretch>
+        </a:blipFill>
+        <a:effectLst/>
+      </p:bgPr>
+    </p:bg>
+    <p:spTree>
+      <p:nvGrpSpPr>
+        <p:cNvPr id="1" name=""/>
+        <p:cNvGrpSpPr/>
+        <p:nvPr/>
+      </p:nvGrpSpPr>
+      <p:grpSpPr>
+        <a:xfrm>
+          <a:off x="0" y="0"/>
+          <a:ext cx="0" cy="0"/>
+          <a:chOff x="0" y="0"/>
+          <a:chExt cx="0" cy="0"/>
+        </a:xfrm>
+      </p:grpSpPr>
+      <p:sp>
+        <p:nvSpPr>
+          <p:cNvPr id="4098" name="Titre 3"/>
+          <p:cNvSpPr>
+            <a:spLocks noGrp="1"/>
+          </p:cNvSpPr>
+          <p:nvPr>
+            <p:ph type="title"/>
+          </p:nvPr>
+        </p:nvSpPr>
+        <p:spPr/>
+        <p:txBody>
+          <a:bodyPr/>
+          <a:lstStyle/>
+          <a:p>
+            <a:r>
               <a:rPr lang="fr-CA" dirty="0">
                 <a:solidFill>
                   <a:schemeClr val="bg1"/>
@@ -6818,7 +7299,7 @@
 </p:sld>
 </file>
 
-<file path=ppt/slides/slide26.xml><?xml version="1.0" encoding="utf-8"?>
+<file path=ppt/slides/slide29.xml><?xml version="1.0" encoding="utf-8"?>
 <p:sld xmlns:a="http://schemas.openxmlformats.org/drawingml/2006/main" xmlns:r="http://schemas.openxmlformats.org/officeDocument/2006/relationships" xmlns:p="http://schemas.openxmlformats.org/presentationml/2006/main">
   <p:cSld>
     <p:bg>
@@ -6932,161 +7413,6 @@
 </p:sld>
 </file>
 
-<file path=ppt/slides/slide27.xml><?xml version="1.0" encoding="utf-8"?>
-<p:sld xmlns:a="http://schemas.openxmlformats.org/drawingml/2006/main" xmlns:r="http://schemas.openxmlformats.org/officeDocument/2006/relationships" xmlns:p="http://schemas.openxmlformats.org/presentationml/2006/main">
-  <p:cSld>
-    <p:bg>
-      <p:bgPr>
-        <a:blipFill dpi="0" rotWithShape="0">
-          <a:blip r:embed="rId2" cstate="print"/>
-          <a:srcRect/>
-          <a:stretch>
-            <a:fillRect/>
-          </a:stretch>
-        </a:blipFill>
-        <a:effectLst/>
-      </p:bgPr>
-    </p:bg>
-    <p:spTree>
-      <p:nvGrpSpPr>
-        <p:cNvPr id="1" name=""/>
-        <p:cNvGrpSpPr/>
-        <p:nvPr/>
-      </p:nvGrpSpPr>
-      <p:grpSpPr>
-        <a:xfrm>
-          <a:off x="0" y="0"/>
-          <a:ext cx="0" cy="0"/>
-          <a:chOff x="0" y="0"/>
-          <a:chExt cx="0" cy="0"/>
-        </a:xfrm>
-      </p:grpSpPr>
-      <p:sp>
-        <p:nvSpPr>
-          <p:cNvPr id="5122" name="Titre 3"/>
-          <p:cNvSpPr>
-            <a:spLocks noGrp="1"/>
-          </p:cNvSpPr>
-          <p:nvPr>
-            <p:ph type="title"/>
-          </p:nvPr>
-        </p:nvSpPr>
-        <p:spPr/>
-        <p:txBody>
-          <a:bodyPr/>
-          <a:lstStyle/>
-          <a:p>
-            <a:r>
-              <a:rPr lang="fr-CA" sz="4000" dirty="0" err="1">
-                <a:solidFill>
-                  <a:schemeClr val="bg1">
-                    <a:lumMod val="95000"/>
-                  </a:schemeClr>
-                </a:solidFill>
-              </a:rPr>
-              <a:t>Bibliography</a:t>
-            </a:r>
-            <a:endParaRPr lang="fr-CA" sz="4000" dirty="0">
-              <a:solidFill>
-                <a:schemeClr val="bg1">
-                  <a:lumMod val="95000"/>
-                </a:schemeClr>
-              </a:solidFill>
-            </a:endParaRPr>
-          </a:p>
-        </p:txBody>
-      </p:sp>
-      <p:sp>
-        <p:nvSpPr>
-          <p:cNvPr id="5123" name="Espace réservé du contenu 4"/>
-          <p:cNvSpPr>
-            <a:spLocks noGrp="1"/>
-          </p:cNvSpPr>
-          <p:nvPr>
-            <p:ph idx="1"/>
-          </p:nvPr>
-        </p:nvSpPr>
-        <p:spPr>
-          <a:xfrm>
-            <a:off x="457200" y="1676400"/>
-            <a:ext cx="8458200" cy="4876800"/>
-          </a:xfrm>
-        </p:spPr>
-        <p:txBody>
-          <a:bodyPr/>
-          <a:lstStyle/>
-          <a:p>
-            <a:r>
-              <a:rPr lang="en-US" sz="1600" dirty="0">
-                <a:solidFill>
-                  <a:schemeClr val="bg1"/>
-                </a:solidFill>
-              </a:rPr>
-              <a:t>https://en.wikipedia.org/wiki/Transport_Layer_Security</a:t>
-            </a:r>
-          </a:p>
-          <a:p>
-            <a:r>
-              <a:rPr lang="en-US" sz="1600" dirty="0">
-                <a:solidFill>
-                  <a:schemeClr val="bg1"/>
-                </a:solidFill>
-              </a:rPr>
-              <a:t>Wiley - SSL and TLS Essentials</a:t>
-            </a:r>
-          </a:p>
-          <a:p>
-            <a:r>
-              <a:rPr lang="fr-CA" sz="1600" dirty="0">
-                <a:solidFill>
-                  <a:schemeClr val="bg1"/>
-                </a:solidFill>
-              </a:rPr>
-              <a:t>https://kinsta.com/blog/tls-1-3/</a:t>
-            </a:r>
-          </a:p>
-          <a:p>
-            <a:r>
-              <a:rPr lang="fr-CA" sz="1600" dirty="0">
-                <a:solidFill>
-                  <a:schemeClr val="bg1"/>
-                </a:solidFill>
-                <a:hlinkClick r:id="rId3">
-                  <a:extLst>
-                    <a:ext uri="{A12FA001-AC4F-418D-AE19-62706E023703}">
-                      <ahyp:hlinkClr xmlns:ahyp="http://schemas.microsoft.com/office/drawing/2018/hyperlinkcolor" val="tx"/>
-                    </a:ext>
-                  </a:extLst>
-                </a:hlinkClick>
-              </a:rPr>
-              <a:t>https://aboutssl.org/ssl-guide/</a:t>
-            </a:r>
-            <a:endParaRPr lang="fr-CA" sz="1600" dirty="0">
-              <a:solidFill>
-                <a:schemeClr val="bg1"/>
-              </a:solidFill>
-            </a:endParaRPr>
-          </a:p>
-          <a:p>
-            <a:r>
-              <a:rPr lang="fr-CA" sz="1600" dirty="0">
-                <a:solidFill>
-                  <a:schemeClr val="bg1"/>
-                </a:solidFill>
-              </a:rPr>
-              <a:t>https://datatracker.ietf.org/doc/rfc8446/</a:t>
-            </a:r>
-          </a:p>
-        </p:txBody>
-      </p:sp>
-    </p:spTree>
-  </p:cSld>
-  <p:clrMapOvr>
-    <a:masterClrMapping/>
-  </p:clrMapOvr>
-</p:sld>
-</file>
-
 <file path=ppt/slides/slide3.xml><?xml version="1.0" encoding="utf-8"?>
 <p:sld xmlns:a="http://schemas.openxmlformats.org/drawingml/2006/main" xmlns:r="http://schemas.openxmlformats.org/officeDocument/2006/relationships" xmlns:p="http://schemas.openxmlformats.org/presentationml/2006/main">
   <p:cSld>
@@ -7229,6 +7555,161 @@
                 <a:srgbClr val="3C5790"/>
               </a:solidFill>
             </a:endParaRPr>
+          </a:p>
+        </p:txBody>
+      </p:sp>
+    </p:spTree>
+  </p:cSld>
+  <p:clrMapOvr>
+    <a:masterClrMapping/>
+  </p:clrMapOvr>
+</p:sld>
+</file>
+
+<file path=ppt/slides/slide30.xml><?xml version="1.0" encoding="utf-8"?>
+<p:sld xmlns:a="http://schemas.openxmlformats.org/drawingml/2006/main" xmlns:r="http://schemas.openxmlformats.org/officeDocument/2006/relationships" xmlns:p="http://schemas.openxmlformats.org/presentationml/2006/main">
+  <p:cSld>
+    <p:bg>
+      <p:bgPr>
+        <a:blipFill dpi="0" rotWithShape="0">
+          <a:blip r:embed="rId2" cstate="print"/>
+          <a:srcRect/>
+          <a:stretch>
+            <a:fillRect/>
+          </a:stretch>
+        </a:blipFill>
+        <a:effectLst/>
+      </p:bgPr>
+    </p:bg>
+    <p:spTree>
+      <p:nvGrpSpPr>
+        <p:cNvPr id="1" name=""/>
+        <p:cNvGrpSpPr/>
+        <p:nvPr/>
+      </p:nvGrpSpPr>
+      <p:grpSpPr>
+        <a:xfrm>
+          <a:off x="0" y="0"/>
+          <a:ext cx="0" cy="0"/>
+          <a:chOff x="0" y="0"/>
+          <a:chExt cx="0" cy="0"/>
+        </a:xfrm>
+      </p:grpSpPr>
+      <p:sp>
+        <p:nvSpPr>
+          <p:cNvPr id="5122" name="Titre 3"/>
+          <p:cNvSpPr>
+            <a:spLocks noGrp="1"/>
+          </p:cNvSpPr>
+          <p:nvPr>
+            <p:ph type="title"/>
+          </p:nvPr>
+        </p:nvSpPr>
+        <p:spPr/>
+        <p:txBody>
+          <a:bodyPr/>
+          <a:lstStyle/>
+          <a:p>
+            <a:r>
+              <a:rPr lang="fr-CA" sz="4000" dirty="0" err="1">
+                <a:solidFill>
+                  <a:schemeClr val="bg1">
+                    <a:lumMod val="95000"/>
+                  </a:schemeClr>
+                </a:solidFill>
+              </a:rPr>
+              <a:t>Bibliography</a:t>
+            </a:r>
+            <a:endParaRPr lang="fr-CA" sz="4000" dirty="0">
+              <a:solidFill>
+                <a:schemeClr val="bg1">
+                  <a:lumMod val="95000"/>
+                </a:schemeClr>
+              </a:solidFill>
+            </a:endParaRPr>
+          </a:p>
+        </p:txBody>
+      </p:sp>
+      <p:sp>
+        <p:nvSpPr>
+          <p:cNvPr id="5123" name="Espace réservé du contenu 4"/>
+          <p:cNvSpPr>
+            <a:spLocks noGrp="1"/>
+          </p:cNvSpPr>
+          <p:nvPr>
+            <p:ph idx="1"/>
+          </p:nvPr>
+        </p:nvSpPr>
+        <p:spPr>
+          <a:xfrm>
+            <a:off x="457200" y="1676400"/>
+            <a:ext cx="8458200" cy="4876800"/>
+          </a:xfrm>
+        </p:spPr>
+        <p:txBody>
+          <a:bodyPr/>
+          <a:lstStyle/>
+          <a:p>
+            <a:r>
+              <a:rPr lang="en-US" sz="1600" dirty="0">
+                <a:solidFill>
+                  <a:schemeClr val="bg1"/>
+                </a:solidFill>
+              </a:rPr>
+              <a:t>https://en.wikipedia.org/wiki/Transport_Layer_Security</a:t>
+            </a:r>
+          </a:p>
+          <a:p>
+            <a:r>
+              <a:rPr lang="en-US" sz="1600" dirty="0">
+                <a:solidFill>
+                  <a:schemeClr val="bg1"/>
+                </a:solidFill>
+              </a:rPr>
+              <a:t>Wiley - SSL and TLS Essentials</a:t>
+            </a:r>
+          </a:p>
+          <a:p>
+            <a:r>
+              <a:rPr lang="fr-CA" sz="1600" dirty="0">
+                <a:solidFill>
+                  <a:schemeClr val="bg1"/>
+                </a:solidFill>
+              </a:rPr>
+              <a:t>https://kinsta.com/blog/tls-1-3/</a:t>
+            </a:r>
+          </a:p>
+          <a:p>
+            <a:r>
+              <a:rPr lang="fr-CA" sz="1600" dirty="0">
+                <a:solidFill>
+                  <a:schemeClr val="bg1"/>
+                </a:solidFill>
+                <a:hlinkClick r:id="rId3">
+                  <a:extLst>
+                    <a:ext uri="{A12FA001-AC4F-418D-AE19-62706E023703}">
+                      <ahyp:hlinkClr xmlns:ahyp="http://schemas.microsoft.com/office/drawing/2018/hyperlinkcolor" val="tx"/>
+                    </a:ext>
+                  </a:extLst>
+                </a:hlinkClick>
+              </a:rPr>
+              <a:t>https://aboutssl.org/ssl-guide/</a:t>
+            </a:r>
+            <a:endParaRPr lang="fr-CA" sz="1600" dirty="0">
+              <a:solidFill>
+                <a:schemeClr val="bg1"/>
+              </a:solidFill>
+            </a:endParaRPr>
+          </a:p>
+          <a:p>
+            <a:r>
+              <a:rPr lang="fr-CA" sz="1600" dirty="0">
+                <a:solidFill>
+                  <a:schemeClr val="bg1"/>
+                </a:solidFill>
+              </a:rPr>
+              <a:t>https://datatracker.ietf.org/doc/rfc8446/</a:t>
+            </a:r>
           </a:p>
         </p:txBody>
       </p:sp>

</xml_diff>